<commit_message>
Fix some issues in #67 (#69)
</commit_message>
<xml_diff>
--- a/patterns/transaction-read-write.pptx
+++ b/patterns/transaction-read-write.pptx
@@ -200,7 +200,7 @@
           <a:p>
             <a:fld id="{CAD4BD24-A097-4F9D-85E9-6A2A24CA2D98}" type="datetimeFigureOut">
               <a:rPr lang="zh-CN" altLang="en-US" smtClean="0"/>
-              <a:t>2023/4/28</a:t>
+              <a:t>2023/4/30</a:t>
             </a:fld>
             <a:endParaRPr lang="zh-CN" altLang="en-US"/>
           </a:p>
@@ -3336,21 +3336,7 @@
                       <a:latin typeface="DengXian" panose="02010600030101010101" pitchFamily="2" charset="-122"/>
                       <a:ea typeface="DengXian" panose="02010600030101010101" pitchFamily="2" charset="-122"/>
                     </a:rPr>
-                    <a:t>${</a:t>
-                  </a:r>
-                  <a:r>
-                    <a:rPr kumimoji="1" lang="en-US" altLang="zh-CN" sz="1000" dirty="0" err="1">
-                      <a:latin typeface="DengXian" panose="02010600030101010101" pitchFamily="2" charset="-122"/>
-                      <a:ea typeface="DengXian" panose="02010600030101010101" pitchFamily="2" charset="-122"/>
-                    </a:rPr>
-                    <a:t>currentTime</a:t>
-                  </a:r>
-                  <a:r>
-                    <a:rPr kumimoji="1" lang="en-US" altLang="zh-CN" sz="1000" dirty="0">
-                      <a:latin typeface="DengXian" panose="02010600030101010101" pitchFamily="2" charset="-122"/>
-                      <a:ea typeface="DengXian" panose="02010600030101010101" pitchFamily="2" charset="-122"/>
-                    </a:rPr>
-                    <a:t>}</a:t>
+                    <a:t>${time}</a:t>
                   </a:r>
                 </a:p>
                 <a:p>
@@ -3388,7 +3374,7 @@
                       <a:latin typeface="DengXian" panose="02010600030101010101" pitchFamily="2" charset="-122"/>
                       <a:ea typeface="DengXian" panose="02010600030101010101" pitchFamily="2" charset="-122"/>
                     </a:rPr>
-                    <a:t>${amt}</a:t>
+                    <a:t>${amount}</a:t>
                   </a:r>
                 </a:p>
               </p:txBody>
@@ -8338,21 +8324,7 @@
                     <a:latin typeface="DengXian" panose="02010600030101010101" pitchFamily="2" charset="-122"/>
                     <a:ea typeface="DengXian" panose="02010600030101010101" pitchFamily="2" charset="-122"/>
                   </a:rPr>
-                  <a:t>${</a:t>
-                </a:r>
-                <a:r>
-                  <a:rPr kumimoji="1" lang="en-US" altLang="zh-CN" sz="1000" dirty="0" err="1">
-                    <a:latin typeface="DengXian" panose="02010600030101010101" pitchFamily="2" charset="-122"/>
-                    <a:ea typeface="DengXian" panose="02010600030101010101" pitchFamily="2" charset="-122"/>
-                  </a:rPr>
-                  <a:t>currentTime</a:t>
-                </a:r>
-                <a:r>
-                  <a:rPr kumimoji="1" lang="en-US" altLang="zh-CN" sz="1000" dirty="0">
-                    <a:latin typeface="DengXian" panose="02010600030101010101" pitchFamily="2" charset="-122"/>
-                    <a:ea typeface="DengXian" panose="02010600030101010101" pitchFamily="2" charset="-122"/>
-                  </a:rPr>
-                  <a:t>}</a:t>
+                  <a:t>${time}</a:t>
                 </a:r>
               </a:p>
               <a:p>
@@ -8390,7 +8362,7 @@
                     <a:latin typeface="DengXian" panose="02010600030101010101" pitchFamily="2" charset="-122"/>
                     <a:ea typeface="DengXian" panose="02010600030101010101" pitchFamily="2" charset="-122"/>
                   </a:rPr>
-                  <a:t>${amt}</a:t>
+                  <a:t>${amount}</a:t>
                 </a:r>
               </a:p>
             </p:txBody>
@@ -15631,26 +15603,16 @@
                 <a:t> </a:t>
               </a:r>
               <a:r>
-                <a:rPr kumimoji="1" lang="en-US" altLang="zh-CN" sz="1100" dirty="0">
+                <a:rPr kumimoji="1" lang="en-US" altLang="zh-CN" sz="1100">
                   <a:latin typeface="DengXian" panose="02010600030101010101" pitchFamily="2" charset="-122"/>
                   <a:ea typeface="DengXian" panose="02010600030101010101" pitchFamily="2" charset="-122"/>
                 </a:rPr>
-                <a:t>${</a:t>
-              </a:r>
-              <a:r>
-                <a:rPr kumimoji="1" lang="en-US" altLang="zh-CN" sz="1100" dirty="0" err="1">
-                  <a:latin typeface="DengXian" panose="02010600030101010101" pitchFamily="2" charset="-122"/>
-                  <a:ea typeface="DengXian" panose="02010600030101010101" pitchFamily="2" charset="-122"/>
-                </a:rPr>
-                <a:t>currentTime</a:t>
-              </a:r>
-              <a:r>
-                <a:rPr kumimoji="1" lang="en-US" altLang="zh-CN" sz="1100" dirty="0">
-                  <a:latin typeface="DengXian" panose="02010600030101010101" pitchFamily="2" charset="-122"/>
-                  <a:ea typeface="DengXian" panose="02010600030101010101" pitchFamily="2" charset="-122"/>
-                </a:rPr>
-                <a:t>}</a:t>
-              </a:r>
+                <a:t>${time}</a:t>
+              </a:r>
+              <a:endParaRPr kumimoji="1" lang="en-US" altLang="zh-CN" sz="1100" dirty="0">
+                <a:latin typeface="DengXian" panose="02010600030101010101" pitchFamily="2" charset="-122"/>
+                <a:ea typeface="DengXian" panose="02010600030101010101" pitchFamily="2" charset="-122"/>
+              </a:endParaRPr>
             </a:p>
           </p:txBody>
         </p:sp>

</xml_diff>

<commit_message>
update rw pattern and desc
</commit_message>
<xml_diff>
--- a/patterns/transaction-read-write.pptx
+++ b/patterns/transaction-read-write.pptx
@@ -3692,7 +3692,7 @@
                       <a:sysClr val="windowText" lastClr="000000"/>
                     </a:solidFill>
                   </a:rPr>
-                  <a:t>acc1</a:t>
+                  <a:t>src</a:t>
                 </a:r>
                 <a:r>
                   <a:rPr kumimoji="1" lang="en-US" altLang="zh-CN" sz="1200" dirty="0">
@@ -3769,16 +3769,6 @@
               <a:p>
                 <a:pPr algn="ctr"/>
                 <a:r>
-                  <a:rPr kumimoji="1" lang="en-US" altLang="zh-CN" sz="1200" b="1" dirty="0">
-                    <a:solidFill>
-                      <a:sysClr val="windowText" lastClr="000000"/>
-                    </a:solidFill>
-                    <a:latin typeface="等线" panose="02010600030101010101" pitchFamily="2" charset="-122"/>
-                    <a:ea typeface="等线" panose="02010600030101010101" pitchFamily="2" charset="-122"/>
-                  </a:rPr>
-                  <a:t>acc1</a:t>
-                </a:r>
-                <a:r>
                   <a:rPr kumimoji="1" lang="en-US" altLang="zh-CN" sz="1200" dirty="0">
                     <a:solidFill>
                       <a:sysClr val="windowText" lastClr="000000"/>
@@ -3786,7 +3776,7 @@
                     <a:latin typeface="等线" panose="02010600030101010101" pitchFamily="2" charset="-122"/>
                     <a:ea typeface="等线" panose="02010600030101010101" pitchFamily="2" charset="-122"/>
                   </a:rPr>
-                  <a:t>.id:</a:t>
+                  <a:t>id =</a:t>
                 </a:r>
                 <a:r>
                   <a:rPr kumimoji="1" lang="zh-CN" altLang="en-US" sz="1200" dirty="0">
@@ -3906,7 +3896,7 @@
                       <a:sysClr val="windowText" lastClr="000000"/>
                     </a:solidFill>
                   </a:rPr>
-                  <a:t>acc2</a:t>
+                  <a:t>dst</a:t>
                 </a:r>
                 <a:r>
                   <a:rPr kumimoji="1" lang="en-US" altLang="zh-CN" sz="1200" dirty="0">
@@ -3983,16 +3973,6 @@
               <a:p>
                 <a:pPr algn="ctr"/>
                 <a:r>
-                  <a:rPr kumimoji="1" lang="en-US" altLang="zh-CN" sz="1200" b="1" dirty="0">
-                    <a:solidFill>
-                      <a:sysClr val="windowText" lastClr="000000"/>
-                    </a:solidFill>
-                    <a:latin typeface="等线" panose="02010600030101010101" pitchFamily="2" charset="-122"/>
-                    <a:ea typeface="等线" panose="02010600030101010101" pitchFamily="2" charset="-122"/>
-                  </a:rPr>
-                  <a:t>acc2</a:t>
-                </a:r>
-                <a:r>
                   <a:rPr kumimoji="1" lang="en-US" altLang="zh-CN" sz="1200" dirty="0">
                     <a:solidFill>
                       <a:sysClr val="windowText" lastClr="000000"/>
@@ -4000,7 +3980,7 @@
                     <a:latin typeface="等线" panose="02010600030101010101" pitchFamily="2" charset="-122"/>
                     <a:ea typeface="等线" panose="02010600030101010101" pitchFamily="2" charset="-122"/>
                   </a:rPr>
-                  <a:t>.id:</a:t>
+                  <a:t>id =</a:t>
                 </a:r>
                 <a:r>
                   <a:rPr kumimoji="1" lang="zh-CN" altLang="en-US" sz="1200" dirty="0">
@@ -4270,16 +4250,6 @@
             <a:p>
               <a:pPr algn="ctr"/>
               <a:r>
-                <a:rPr kumimoji="1" lang="en-US" altLang="zh-CN" sz="1200" b="1" dirty="0" err="1">
-                  <a:solidFill>
-                    <a:sysClr val="windowText" lastClr="000000"/>
-                  </a:solidFill>
-                  <a:latin typeface="等线" panose="02010600030101010101" pitchFamily="2" charset="-122"/>
-                  <a:ea typeface="等线" panose="02010600030101010101" pitchFamily="2" charset="-122"/>
-                </a:rPr>
-                <a:t>src</a:t>
-              </a:r>
-              <a:r>
                 <a:rPr kumimoji="1" lang="en-US" altLang="zh-CN" sz="1200" dirty="0" err="1">
                   <a:solidFill>
                     <a:sysClr val="windowText" lastClr="000000"/>
@@ -4287,7 +4257,7 @@
                   <a:latin typeface="等线" panose="02010600030101010101" pitchFamily="2" charset="-122"/>
                   <a:ea typeface="等线" panose="02010600030101010101" pitchFamily="2" charset="-122"/>
                 </a:rPr>
-                <a:t>.id</a:t>
+                <a:t>id</a:t>
               </a:r>
               <a:r>
                 <a:rPr kumimoji="1" lang="zh-CN" altLang="en-US" sz="1200" dirty="0">
@@ -4728,14 +4698,6 @@
             <a:p>
               <a:pPr algn="ctr"/>
               <a:r>
-                <a:rPr kumimoji="1" lang="en-US" altLang="zh-CN" sz="1200" b="1" dirty="0" err="1">
-                  <a:solidFill>
-                    <a:sysClr val="windowText" lastClr="000000"/>
-                  </a:solidFill>
-                </a:rPr>
-                <a:t>dst</a:t>
-              </a:r>
-              <a:r>
                 <a:rPr kumimoji="1" lang="en-US" altLang="zh-CN" sz="1200" dirty="0" err="1">
                   <a:solidFill>
                     <a:sysClr val="windowText" lastClr="000000"/>
@@ -4743,7 +4705,7 @@
                   <a:latin typeface="等线" panose="02010600030101010101" pitchFamily="2" charset="-122"/>
                   <a:ea typeface="等线" panose="02010600030101010101" pitchFamily="2" charset="-122"/>
                 </a:rPr>
-                <a:t>.id</a:t>
+                <a:t>id</a:t>
               </a:r>
               <a:r>
                 <a:rPr kumimoji="1" lang="zh-CN" altLang="en-US" sz="1200" dirty="0">
@@ -8271,7 +8233,7 @@
                       <a:sysClr val="windowText" lastClr="000000"/>
                     </a:solidFill>
                   </a:rPr>
-                  <a:t>acc1</a:t>
+                  <a:t>src</a:t>
                 </a:r>
                 <a:r>
                   <a:rPr kumimoji="1" lang="en-US" altLang="zh-CN" sz="1200" dirty="0">
@@ -8348,14 +8310,6 @@
               <a:p>
                 <a:pPr algn="ctr"/>
                 <a:r>
-                  <a:rPr kumimoji="1" lang="en-US" altLang="zh-CN" sz="1200" b="1" dirty="0">
-                    <a:solidFill>
-                      <a:sysClr val="windowText" lastClr="000000"/>
-                    </a:solidFill>
-                  </a:rPr>
-                  <a:t>acc1</a:t>
-                </a:r>
-                <a:r>
                   <a:rPr kumimoji="1" lang="en-US" altLang="zh-CN" sz="1200" dirty="0">
                     <a:solidFill>
                       <a:sysClr val="windowText" lastClr="000000"/>
@@ -8363,7 +8317,7 @@
                     <a:latin typeface="等线" panose="02010600030101010101" pitchFamily="2" charset="-122"/>
                     <a:ea typeface="等线" panose="02010600030101010101" pitchFamily="2" charset="-122"/>
                   </a:rPr>
-                  <a:t>.id:</a:t>
+                  <a:t>id =</a:t>
                 </a:r>
                 <a:r>
                   <a:rPr kumimoji="1" lang="zh-CN" altLang="en-US" sz="1200" dirty="0">
@@ -8483,7 +8437,7 @@
                       <a:sysClr val="windowText" lastClr="000000"/>
                     </a:solidFill>
                   </a:rPr>
-                  <a:t>acc2</a:t>
+                  <a:t>dst</a:t>
                 </a:r>
                 <a:r>
                   <a:rPr kumimoji="1" lang="en-US" altLang="zh-CN" sz="1200" dirty="0">
@@ -8560,16 +8514,6 @@
               <a:p>
                 <a:pPr algn="ctr"/>
                 <a:r>
-                  <a:rPr kumimoji="1" lang="en-US" altLang="zh-CN" sz="1200" b="1" dirty="0">
-                    <a:solidFill>
-                      <a:sysClr val="windowText" lastClr="000000"/>
-                    </a:solidFill>
-                    <a:latin typeface="等线" panose="02010600030101010101" pitchFamily="2" charset="-122"/>
-                    <a:ea typeface="等线" panose="02010600030101010101" pitchFamily="2" charset="-122"/>
-                  </a:rPr>
-                  <a:t>acc2</a:t>
-                </a:r>
-                <a:r>
                   <a:rPr kumimoji="1" lang="en-US" altLang="zh-CN" sz="1200" dirty="0">
                     <a:solidFill>
                       <a:sysClr val="windowText" lastClr="000000"/>
@@ -8577,7 +8521,7 @@
                     <a:latin typeface="等线" panose="02010600030101010101" pitchFamily="2" charset="-122"/>
                     <a:ea typeface="等线" panose="02010600030101010101" pitchFamily="2" charset="-122"/>
                   </a:rPr>
-                  <a:t>.id:</a:t>
+                  <a:t>id =</a:t>
                 </a:r>
                 <a:r>
                   <a:rPr kumimoji="1" lang="zh-CN" altLang="en-US" sz="1200" dirty="0">
@@ -9326,7 +9270,7 @@
                       <a:sysClr val="windowText" lastClr="000000"/>
                     </a:solidFill>
                   </a:rPr>
-                  <a:t>acc1:</a:t>
+                  <a:t>src:</a:t>
                 </a:r>
                 <a:r>
                   <a:rPr kumimoji="1" lang="zh-CN" altLang="en-US" sz="1200" b="1" dirty="0">
@@ -9602,7 +9546,7 @@
                       <a:sysClr val="windowText" lastClr="000000"/>
                     </a:solidFill>
                   </a:rPr>
-                  <a:t>acc2:</a:t>
+                  <a:t>dst:</a:t>
                 </a:r>
                 <a:r>
                   <a:rPr kumimoji="1" lang="zh-CN" altLang="en-US" sz="1200" b="1" dirty="0">
@@ -10078,20 +10022,12 @@
               <a:p>
                 <a:pPr algn="ctr"/>
                 <a:r>
-                  <a:rPr kumimoji="1" lang="en-US" altLang="zh-CN" sz="1100" b="1" dirty="0">
+                  <a:rPr kumimoji="1" lang="en-US" sz="1100" b="1" dirty="0">
                     <a:solidFill>
                       <a:sysClr val="windowText" lastClr="000000"/>
                     </a:solidFill>
                   </a:rPr>
-                  <a:t>mid</a:t>
-                </a:r>
-                <a:r>
-                  <a:rPr kumimoji="1" lang="zh-CN" altLang="en-US" sz="1100" dirty="0">
-                    <a:solidFill>
-                      <a:sysClr val="windowText" lastClr="000000"/>
-                    </a:solidFill>
-                  </a:rPr>
-                  <a:t> </a:t>
+                  <a:t>src</a:t>
                 </a:r>
                 <a:r>
                   <a:rPr kumimoji="1" lang="en-US" altLang="zh-CN" sz="1100" dirty="0">
@@ -10168,16 +10104,6 @@
               <a:p>
                 <a:pPr algn="ctr"/>
                 <a:r>
-                  <a:rPr kumimoji="1" lang="en-US" altLang="zh-CN" sz="1100" b="1" dirty="0" err="1">
-                    <a:solidFill>
-                      <a:sysClr val="windowText" lastClr="000000"/>
-                    </a:solidFill>
-                    <a:latin typeface="等线" panose="02010600030101010101" pitchFamily="2" charset="-122"/>
-                    <a:ea typeface="等线" panose="02010600030101010101" pitchFamily="2" charset="-122"/>
-                  </a:rPr>
-                  <a:t>mid</a:t>
-                </a:r>
-                <a:r>
                   <a:rPr kumimoji="1" lang="en-US" altLang="zh-CN" sz="1100" dirty="0" err="1">
                     <a:solidFill>
                       <a:sysClr val="windowText" lastClr="000000"/>
@@ -10185,7 +10111,7 @@
                     <a:latin typeface="等线" panose="02010600030101010101" pitchFamily="2" charset="-122"/>
                     <a:ea typeface="等线" panose="02010600030101010101" pitchFamily="2" charset="-122"/>
                   </a:rPr>
-                  <a:t>.id</a:t>
+                  <a:t>id</a:t>
                 </a:r>
                 <a:r>
                   <a:rPr kumimoji="1" lang="zh-CN" altLang="en-US" sz="1100" dirty="0">
@@ -10306,38 +10232,6 @@
             <a:p>
               <a:pPr algn="ctr"/>
               <a:r>
-                <a:rPr kumimoji="1" lang="en-US" altLang="zh-CN" sz="1050" b="1" dirty="0">
-                  <a:solidFill>
-                    <a:sysClr val="windowText" lastClr="000000"/>
-                  </a:solidFill>
-                </a:rPr>
-                <a:t>dst1</a:t>
-              </a:r>
-              <a:r>
-                <a:rPr kumimoji="1" lang="zh-CN" altLang="en-US" sz="1050" b="1" dirty="0">
-                  <a:solidFill>
-                    <a:sysClr val="windowText" lastClr="000000"/>
-                  </a:solidFill>
-                </a:rPr>
-                <a:t> </a:t>
-              </a:r>
-              <a:r>
-                <a:rPr kumimoji="1" lang="en-US" altLang="zh-CN" sz="1050" dirty="0">
-                  <a:solidFill>
-                    <a:sysClr val="windowText" lastClr="000000"/>
-                  </a:solidFill>
-                </a:rPr>
-                <a:t>:</a:t>
-              </a:r>
-              <a:r>
-                <a:rPr kumimoji="1" lang="zh-CN" altLang="en-US" sz="1050" dirty="0">
-                  <a:solidFill>
-                    <a:sysClr val="windowText" lastClr="000000"/>
-                  </a:solidFill>
-                </a:rPr>
-                <a:t> </a:t>
-              </a:r>
-              <a:r>
                 <a:rPr kumimoji="1" lang="en-US" altLang="zh-CN" sz="1050" dirty="0">
                   <a:solidFill>
                     <a:sysClr val="windowText" lastClr="000000"/>
@@ -10401,38 +10295,6 @@
             <a:p>
               <a:pPr algn="ctr"/>
               <a:r>
-                <a:rPr kumimoji="1" lang="en-US" altLang="zh-CN" sz="1050" b="1" dirty="0">
-                  <a:solidFill>
-                    <a:sysClr val="windowText" lastClr="000000"/>
-                  </a:solidFill>
-                </a:rPr>
-                <a:t>dst2</a:t>
-              </a:r>
-              <a:r>
-                <a:rPr kumimoji="1" lang="zh-CN" altLang="en-US" sz="1050" b="1" dirty="0">
-                  <a:solidFill>
-                    <a:sysClr val="windowText" lastClr="000000"/>
-                  </a:solidFill>
-                </a:rPr>
-                <a:t> </a:t>
-              </a:r>
-              <a:r>
-                <a:rPr kumimoji="1" lang="en-US" altLang="zh-CN" sz="1050" dirty="0">
-                  <a:solidFill>
-                    <a:sysClr val="windowText" lastClr="000000"/>
-                  </a:solidFill>
-                </a:rPr>
-                <a:t>:</a:t>
-              </a:r>
-              <a:r>
-                <a:rPr kumimoji="1" lang="zh-CN" altLang="en-US" sz="1050" dirty="0">
-                  <a:solidFill>
-                    <a:sysClr val="windowText" lastClr="000000"/>
-                  </a:solidFill>
-                </a:rPr>
-                <a:t> </a:t>
-              </a:r>
-              <a:r>
                 <a:rPr kumimoji="1" lang="en-US" altLang="zh-CN" sz="1050" dirty="0">
                   <a:solidFill>
                     <a:sysClr val="windowText" lastClr="000000"/>
@@ -10495,38 +10357,6 @@
             <a:lstStyle/>
             <a:p>
               <a:pPr algn="ctr"/>
-              <a:r>
-                <a:rPr kumimoji="1" lang="en-US" altLang="zh-CN" sz="1050" b="1" dirty="0">
-                  <a:solidFill>
-                    <a:sysClr val="windowText" lastClr="000000"/>
-                  </a:solidFill>
-                </a:rPr>
-                <a:t>dst3</a:t>
-              </a:r>
-              <a:r>
-                <a:rPr kumimoji="1" lang="zh-CN" altLang="en-US" sz="1050" b="1" dirty="0">
-                  <a:solidFill>
-                    <a:sysClr val="windowText" lastClr="000000"/>
-                  </a:solidFill>
-                </a:rPr>
-                <a:t> </a:t>
-              </a:r>
-              <a:r>
-                <a:rPr kumimoji="1" lang="en-US" altLang="zh-CN" sz="1050" dirty="0">
-                  <a:solidFill>
-                    <a:sysClr val="windowText" lastClr="000000"/>
-                  </a:solidFill>
-                </a:rPr>
-                <a:t>:</a:t>
-              </a:r>
-              <a:r>
-                <a:rPr kumimoji="1" lang="zh-CN" altLang="en-US" sz="1050" dirty="0">
-                  <a:solidFill>
-                    <a:sysClr val="windowText" lastClr="000000"/>
-                  </a:solidFill>
-                </a:rPr>
-                <a:t> </a:t>
-              </a:r>
               <a:r>
                 <a:rPr kumimoji="1" lang="en-US" altLang="zh-CN" sz="1050" dirty="0">
                   <a:solidFill>
@@ -10711,38 +10541,6 @@
             <a:p>
               <a:pPr algn="ctr"/>
               <a:r>
-                <a:rPr kumimoji="1" lang="en-US" altLang="zh-CN" sz="1050" b="1" dirty="0">
-                  <a:solidFill>
-                    <a:sysClr val="windowText" lastClr="000000"/>
-                  </a:solidFill>
-                </a:rPr>
-                <a:t>src1</a:t>
-              </a:r>
-              <a:r>
-                <a:rPr kumimoji="1" lang="zh-CN" altLang="en-US" sz="1050" b="1" dirty="0">
-                  <a:solidFill>
-                    <a:sysClr val="windowText" lastClr="000000"/>
-                  </a:solidFill>
-                </a:rPr>
-                <a:t> </a:t>
-              </a:r>
-              <a:r>
-                <a:rPr kumimoji="1" lang="en-US" altLang="zh-CN" sz="1050" dirty="0">
-                  <a:solidFill>
-                    <a:sysClr val="windowText" lastClr="000000"/>
-                  </a:solidFill>
-                </a:rPr>
-                <a:t>:</a:t>
-              </a:r>
-              <a:r>
-                <a:rPr kumimoji="1" lang="zh-CN" altLang="en-US" sz="1050" dirty="0">
-                  <a:solidFill>
-                    <a:sysClr val="windowText" lastClr="000000"/>
-                  </a:solidFill>
-                </a:rPr>
-                <a:t> </a:t>
-              </a:r>
-              <a:r>
                 <a:rPr kumimoji="1" lang="en-US" altLang="zh-CN" sz="1050" dirty="0">
                   <a:solidFill>
                     <a:sysClr val="windowText" lastClr="000000"/>
@@ -10806,38 +10604,6 @@
             <a:p>
               <a:pPr algn="ctr"/>
               <a:r>
-                <a:rPr kumimoji="1" lang="en-US" altLang="zh-CN" sz="1050" b="1" dirty="0">
-                  <a:solidFill>
-                    <a:sysClr val="windowText" lastClr="000000"/>
-                  </a:solidFill>
-                </a:rPr>
-                <a:t>src2</a:t>
-              </a:r>
-              <a:r>
-                <a:rPr kumimoji="1" lang="zh-CN" altLang="en-US" sz="1050" b="1" dirty="0">
-                  <a:solidFill>
-                    <a:sysClr val="windowText" lastClr="000000"/>
-                  </a:solidFill>
-                </a:rPr>
-                <a:t> </a:t>
-              </a:r>
-              <a:r>
-                <a:rPr kumimoji="1" lang="en-US" altLang="zh-CN" sz="1050" dirty="0">
-                  <a:solidFill>
-                    <a:sysClr val="windowText" lastClr="000000"/>
-                  </a:solidFill>
-                </a:rPr>
-                <a:t>:</a:t>
-              </a:r>
-              <a:r>
-                <a:rPr kumimoji="1" lang="zh-CN" altLang="en-US" sz="1050" dirty="0">
-                  <a:solidFill>
-                    <a:sysClr val="windowText" lastClr="000000"/>
-                  </a:solidFill>
-                </a:rPr>
-                <a:t> </a:t>
-              </a:r>
-              <a:r>
                 <a:rPr kumimoji="1" lang="en-US" altLang="zh-CN" sz="1050" dirty="0">
                   <a:solidFill>
                     <a:sysClr val="windowText" lastClr="000000"/>
@@ -10900,38 +10666,6 @@
             <a:lstStyle/>
             <a:p>
               <a:pPr algn="ctr"/>
-              <a:r>
-                <a:rPr kumimoji="1" lang="en-US" altLang="zh-CN" sz="1050" b="1" dirty="0">
-                  <a:solidFill>
-                    <a:sysClr val="windowText" lastClr="000000"/>
-                  </a:solidFill>
-                </a:rPr>
-                <a:t>src3</a:t>
-              </a:r>
-              <a:r>
-                <a:rPr kumimoji="1" lang="zh-CN" altLang="en-US" sz="1050" b="1" dirty="0">
-                  <a:solidFill>
-                    <a:sysClr val="windowText" lastClr="000000"/>
-                  </a:solidFill>
-                </a:rPr>
-                <a:t> </a:t>
-              </a:r>
-              <a:r>
-                <a:rPr kumimoji="1" lang="en-US" altLang="zh-CN" sz="1050" dirty="0">
-                  <a:solidFill>
-                    <a:sysClr val="windowText" lastClr="000000"/>
-                  </a:solidFill>
-                </a:rPr>
-                <a:t>:</a:t>
-              </a:r>
-              <a:r>
-                <a:rPr kumimoji="1" lang="zh-CN" altLang="en-US" sz="1050" dirty="0">
-                  <a:solidFill>
-                    <a:sysClr val="windowText" lastClr="000000"/>
-                  </a:solidFill>
-                </a:rPr>
-                <a:t> </a:t>
-              </a:r>
               <a:r>
                 <a:rPr kumimoji="1" lang="en-US" altLang="zh-CN" sz="1050" dirty="0">
                   <a:solidFill>
@@ -11257,20 +10991,12 @@
               <a:p>
                 <a:pPr algn="ctr"/>
                 <a:r>
-                  <a:rPr kumimoji="1" lang="en-US" altLang="zh-CN" sz="1100" b="1" dirty="0">
+                  <a:rPr kumimoji="1" lang="en-US" sz="1100" b="1" dirty="0">
                     <a:solidFill>
                       <a:sysClr val="windowText" lastClr="000000"/>
                     </a:solidFill>
                   </a:rPr>
-                  <a:t>mid</a:t>
-                </a:r>
-                <a:r>
-                  <a:rPr kumimoji="1" lang="zh-CN" altLang="en-US" sz="1100" dirty="0">
-                    <a:solidFill>
-                      <a:sysClr val="windowText" lastClr="000000"/>
-                    </a:solidFill>
-                  </a:rPr>
-                  <a:t> </a:t>
+                  <a:t>dst</a:t>
                 </a:r>
                 <a:r>
                   <a:rPr kumimoji="1" lang="en-US" altLang="zh-CN" sz="1100" dirty="0">
@@ -11347,16 +11073,6 @@
               <a:p>
                 <a:pPr algn="ctr"/>
                 <a:r>
-                  <a:rPr kumimoji="1" lang="en-US" altLang="zh-CN" sz="1100" b="1" dirty="0" err="1">
-                    <a:solidFill>
-                      <a:sysClr val="windowText" lastClr="000000"/>
-                    </a:solidFill>
-                    <a:latin typeface="等线" panose="02010600030101010101" pitchFamily="2" charset="-122"/>
-                    <a:ea typeface="等线" panose="02010600030101010101" pitchFamily="2" charset="-122"/>
-                  </a:rPr>
-                  <a:t>mid</a:t>
-                </a:r>
-                <a:r>
                   <a:rPr kumimoji="1" lang="en-US" altLang="zh-CN" sz="1100" dirty="0" err="1">
                     <a:solidFill>
                       <a:sysClr val="windowText" lastClr="000000"/>
@@ -11364,7 +11080,7 @@
                     <a:latin typeface="等线" panose="02010600030101010101" pitchFamily="2" charset="-122"/>
                     <a:ea typeface="等线" panose="02010600030101010101" pitchFamily="2" charset="-122"/>
                   </a:rPr>
-                  <a:t>.id</a:t>
+                  <a:t>id</a:t>
                 </a:r>
                 <a:r>
                   <a:rPr kumimoji="1" lang="zh-CN" altLang="en-US" sz="1100" dirty="0">
@@ -11485,38 +11201,6 @@
             <a:p>
               <a:pPr algn="ctr"/>
               <a:r>
-                <a:rPr kumimoji="1" lang="en-US" altLang="zh-CN" sz="1050" b="1" dirty="0">
-                  <a:solidFill>
-                    <a:sysClr val="windowText" lastClr="000000"/>
-                  </a:solidFill>
-                </a:rPr>
-                <a:t>dst1</a:t>
-              </a:r>
-              <a:r>
-                <a:rPr kumimoji="1" lang="zh-CN" altLang="en-US" sz="1050" b="1" dirty="0">
-                  <a:solidFill>
-                    <a:sysClr val="windowText" lastClr="000000"/>
-                  </a:solidFill>
-                </a:rPr>
-                <a:t> </a:t>
-              </a:r>
-              <a:r>
-                <a:rPr kumimoji="1" lang="en-US" altLang="zh-CN" sz="1050" dirty="0">
-                  <a:solidFill>
-                    <a:sysClr val="windowText" lastClr="000000"/>
-                  </a:solidFill>
-                </a:rPr>
-                <a:t>:</a:t>
-              </a:r>
-              <a:r>
-                <a:rPr kumimoji="1" lang="zh-CN" altLang="en-US" sz="1050" dirty="0">
-                  <a:solidFill>
-                    <a:sysClr val="windowText" lastClr="000000"/>
-                  </a:solidFill>
-                </a:rPr>
-                <a:t> </a:t>
-              </a:r>
-              <a:r>
                 <a:rPr kumimoji="1" lang="en-US" altLang="zh-CN" sz="1050" dirty="0">
                   <a:solidFill>
                     <a:sysClr val="windowText" lastClr="000000"/>
@@ -11580,38 +11264,6 @@
             <a:p>
               <a:pPr algn="ctr"/>
               <a:r>
-                <a:rPr kumimoji="1" lang="en-US" altLang="zh-CN" sz="1050" b="1" dirty="0">
-                  <a:solidFill>
-                    <a:sysClr val="windowText" lastClr="000000"/>
-                  </a:solidFill>
-                </a:rPr>
-                <a:t>dst2</a:t>
-              </a:r>
-              <a:r>
-                <a:rPr kumimoji="1" lang="zh-CN" altLang="en-US" sz="1050" b="1" dirty="0">
-                  <a:solidFill>
-                    <a:sysClr val="windowText" lastClr="000000"/>
-                  </a:solidFill>
-                </a:rPr>
-                <a:t> </a:t>
-              </a:r>
-              <a:r>
-                <a:rPr kumimoji="1" lang="en-US" altLang="zh-CN" sz="1050" dirty="0">
-                  <a:solidFill>
-                    <a:sysClr val="windowText" lastClr="000000"/>
-                  </a:solidFill>
-                </a:rPr>
-                <a:t>:</a:t>
-              </a:r>
-              <a:r>
-                <a:rPr kumimoji="1" lang="zh-CN" altLang="en-US" sz="1050" dirty="0">
-                  <a:solidFill>
-                    <a:sysClr val="windowText" lastClr="000000"/>
-                  </a:solidFill>
-                </a:rPr>
-                <a:t> </a:t>
-              </a:r>
-              <a:r>
                 <a:rPr kumimoji="1" lang="en-US" altLang="zh-CN" sz="1050" dirty="0">
                   <a:solidFill>
                     <a:sysClr val="windowText" lastClr="000000"/>
@@ -11674,38 +11326,6 @@
             <a:lstStyle/>
             <a:p>
               <a:pPr algn="ctr"/>
-              <a:r>
-                <a:rPr kumimoji="1" lang="en-US" altLang="zh-CN" sz="1050" b="1" dirty="0">
-                  <a:solidFill>
-                    <a:sysClr val="windowText" lastClr="000000"/>
-                  </a:solidFill>
-                </a:rPr>
-                <a:t>dst3</a:t>
-              </a:r>
-              <a:r>
-                <a:rPr kumimoji="1" lang="zh-CN" altLang="en-US" sz="1050" b="1" dirty="0">
-                  <a:solidFill>
-                    <a:sysClr val="windowText" lastClr="000000"/>
-                  </a:solidFill>
-                </a:rPr>
-                <a:t> </a:t>
-              </a:r>
-              <a:r>
-                <a:rPr kumimoji="1" lang="en-US" altLang="zh-CN" sz="1050" dirty="0">
-                  <a:solidFill>
-                    <a:sysClr val="windowText" lastClr="000000"/>
-                  </a:solidFill>
-                </a:rPr>
-                <a:t>:</a:t>
-              </a:r>
-              <a:r>
-                <a:rPr kumimoji="1" lang="zh-CN" altLang="en-US" sz="1050" dirty="0">
-                  <a:solidFill>
-                    <a:sysClr val="windowText" lastClr="000000"/>
-                  </a:solidFill>
-                </a:rPr>
-                <a:t> </a:t>
-              </a:r>
               <a:r>
                 <a:rPr kumimoji="1" lang="en-US" altLang="zh-CN" sz="1050" dirty="0">
                   <a:solidFill>
@@ -11890,38 +11510,6 @@
             <a:p>
               <a:pPr algn="ctr"/>
               <a:r>
-                <a:rPr kumimoji="1" lang="en-US" altLang="zh-CN" sz="1050" b="1" dirty="0">
-                  <a:solidFill>
-                    <a:sysClr val="windowText" lastClr="000000"/>
-                  </a:solidFill>
-                </a:rPr>
-                <a:t>src1</a:t>
-              </a:r>
-              <a:r>
-                <a:rPr kumimoji="1" lang="zh-CN" altLang="en-US" sz="1050" b="1" dirty="0">
-                  <a:solidFill>
-                    <a:sysClr val="windowText" lastClr="000000"/>
-                  </a:solidFill>
-                </a:rPr>
-                <a:t> </a:t>
-              </a:r>
-              <a:r>
-                <a:rPr kumimoji="1" lang="en-US" altLang="zh-CN" sz="1050" dirty="0">
-                  <a:solidFill>
-                    <a:sysClr val="windowText" lastClr="000000"/>
-                  </a:solidFill>
-                </a:rPr>
-                <a:t>:</a:t>
-              </a:r>
-              <a:r>
-                <a:rPr kumimoji="1" lang="zh-CN" altLang="en-US" sz="1050" dirty="0">
-                  <a:solidFill>
-                    <a:sysClr val="windowText" lastClr="000000"/>
-                  </a:solidFill>
-                </a:rPr>
-                <a:t> </a:t>
-              </a:r>
-              <a:r>
                 <a:rPr kumimoji="1" lang="en-US" altLang="zh-CN" sz="1050" dirty="0">
                   <a:solidFill>
                     <a:sysClr val="windowText" lastClr="000000"/>
@@ -11985,38 +11573,6 @@
             <a:p>
               <a:pPr algn="ctr"/>
               <a:r>
-                <a:rPr kumimoji="1" lang="en-US" altLang="zh-CN" sz="1050" b="1" dirty="0">
-                  <a:solidFill>
-                    <a:sysClr val="windowText" lastClr="000000"/>
-                  </a:solidFill>
-                </a:rPr>
-                <a:t>src2</a:t>
-              </a:r>
-              <a:r>
-                <a:rPr kumimoji="1" lang="zh-CN" altLang="en-US" sz="1050" b="1" dirty="0">
-                  <a:solidFill>
-                    <a:sysClr val="windowText" lastClr="000000"/>
-                  </a:solidFill>
-                </a:rPr>
-                <a:t> </a:t>
-              </a:r>
-              <a:r>
-                <a:rPr kumimoji="1" lang="en-US" altLang="zh-CN" sz="1050" dirty="0">
-                  <a:solidFill>
-                    <a:sysClr val="windowText" lastClr="000000"/>
-                  </a:solidFill>
-                </a:rPr>
-                <a:t>:</a:t>
-              </a:r>
-              <a:r>
-                <a:rPr kumimoji="1" lang="zh-CN" altLang="en-US" sz="1050" dirty="0">
-                  <a:solidFill>
-                    <a:sysClr val="windowText" lastClr="000000"/>
-                  </a:solidFill>
-                </a:rPr>
-                <a:t> </a:t>
-              </a:r>
-              <a:r>
                 <a:rPr kumimoji="1" lang="en-US" altLang="zh-CN" sz="1050" dirty="0">
                   <a:solidFill>
                     <a:sysClr val="windowText" lastClr="000000"/>
@@ -12079,38 +11635,6 @@
             <a:lstStyle/>
             <a:p>
               <a:pPr algn="ctr"/>
-              <a:r>
-                <a:rPr kumimoji="1" lang="en-US" altLang="zh-CN" sz="1050" b="1" dirty="0">
-                  <a:solidFill>
-                    <a:sysClr val="windowText" lastClr="000000"/>
-                  </a:solidFill>
-                </a:rPr>
-                <a:t>src3</a:t>
-              </a:r>
-              <a:r>
-                <a:rPr kumimoji="1" lang="zh-CN" altLang="en-US" sz="1050" b="1" dirty="0">
-                  <a:solidFill>
-                    <a:sysClr val="windowText" lastClr="000000"/>
-                  </a:solidFill>
-                </a:rPr>
-                <a:t> </a:t>
-              </a:r>
-              <a:r>
-                <a:rPr kumimoji="1" lang="en-US" altLang="zh-CN" sz="1050" dirty="0">
-                  <a:solidFill>
-                    <a:sysClr val="windowText" lastClr="000000"/>
-                  </a:solidFill>
-                </a:rPr>
-                <a:t>:</a:t>
-              </a:r>
-              <a:r>
-                <a:rPr kumimoji="1" lang="zh-CN" altLang="en-US" sz="1050" dirty="0">
-                  <a:solidFill>
-                    <a:sysClr val="windowText" lastClr="000000"/>
-                  </a:solidFill>
-                </a:rPr>
-                <a:t> </a:t>
-              </a:r>
               <a:r>
                 <a:rPr kumimoji="1" lang="en-US" altLang="zh-CN" sz="1050" dirty="0">
                   <a:solidFill>
@@ -13744,34 +13268,14 @@
           <a:p>
             <a:pPr algn="ctr"/>
             <a:r>
-              <a:rPr kumimoji="1" lang="en-US" altLang="zh-CN" sz="1100" b="1" dirty="0" err="1">
+              <a:rPr kumimoji="1" lang="en-US" altLang="zh-CN" sz="1100" dirty="0" err="1">
                 <a:solidFill>
                   <a:sysClr val="windowText" lastClr="000000"/>
                 </a:solidFill>
                 <a:latin typeface="等线" panose="02010600030101010101" pitchFamily="2" charset="-122"/>
                 <a:ea typeface="等线" panose="02010600030101010101" pitchFamily="2" charset="-122"/>
               </a:rPr>
-              <a:t>person</a:t>
-            </a:r>
-            <a:r>
-              <a:rPr kumimoji="1" lang="en-US" altLang="zh-CN" sz="1100" dirty="0" err="1">
-                <a:solidFill>
-                  <a:sysClr val="windowText" lastClr="000000"/>
-                </a:solidFill>
-                <a:latin typeface="等线" panose="02010600030101010101" pitchFamily="2" charset="-122"/>
-                <a:ea typeface="等线" panose="02010600030101010101" pitchFamily="2" charset="-122"/>
-              </a:rPr>
-              <a:t>.id</a:t>
-            </a:r>
-            <a:r>
-              <a:rPr kumimoji="1" lang="en-US" altLang="zh-CN" sz="1100" dirty="0">
-                <a:solidFill>
-                  <a:sysClr val="windowText" lastClr="000000"/>
-                </a:solidFill>
-                <a:latin typeface="等线" panose="02010600030101010101" pitchFamily="2" charset="-122"/>
-                <a:ea typeface="等线" panose="02010600030101010101" pitchFamily="2" charset="-122"/>
-              </a:rPr>
-              <a:t>:</a:t>
+              <a:t>id =</a:t>
             </a:r>
             <a:r>
               <a:rPr kumimoji="1" lang="zh-CN" altLang="en-US" sz="1100" dirty="0">
@@ -13876,7 +13380,7 @@
                   <a:sysClr val="windowText" lastClr="000000"/>
                 </a:solidFill>
               </a:rPr>
-              <a:t>person1</a:t>
+              <a:t>src</a:t>
             </a:r>
             <a:r>
               <a:rPr kumimoji="1" lang="en-US" altLang="zh-CN" sz="1100" dirty="0">
@@ -13953,34 +13457,14 @@
           <a:p>
             <a:pPr algn="ctr"/>
             <a:r>
-              <a:rPr kumimoji="1" lang="en-US" altLang="zh-CN" sz="1100" b="1" dirty="0" err="1">
+              <a:rPr kumimoji="1" lang="en-US" altLang="zh-CN" sz="1100" dirty="0" err="1">
                 <a:solidFill>
                   <a:sysClr val="windowText" lastClr="000000"/>
                 </a:solidFill>
                 <a:latin typeface="等线" panose="02010600030101010101" pitchFamily="2" charset="-122"/>
                 <a:ea typeface="等线" panose="02010600030101010101" pitchFamily="2" charset="-122"/>
               </a:rPr>
-              <a:t>person</a:t>
-            </a:r>
-            <a:r>
-              <a:rPr kumimoji="1" lang="en-US" altLang="zh-CN" sz="1100" dirty="0" err="1">
-                <a:solidFill>
-                  <a:sysClr val="windowText" lastClr="000000"/>
-                </a:solidFill>
-                <a:latin typeface="等线" panose="02010600030101010101" pitchFamily="2" charset="-122"/>
-                <a:ea typeface="等线" panose="02010600030101010101" pitchFamily="2" charset="-122"/>
-              </a:rPr>
-              <a:t>.id</a:t>
-            </a:r>
-            <a:r>
-              <a:rPr kumimoji="1" lang="en-US" altLang="zh-CN" sz="1100" dirty="0">
-                <a:solidFill>
-                  <a:sysClr val="windowText" lastClr="000000"/>
-                </a:solidFill>
-                <a:latin typeface="等线" panose="02010600030101010101" pitchFamily="2" charset="-122"/>
-                <a:ea typeface="等线" panose="02010600030101010101" pitchFamily="2" charset="-122"/>
-              </a:rPr>
-              <a:t>:</a:t>
+              <a:t>id =</a:t>
             </a:r>
             <a:r>
               <a:rPr kumimoji="1" lang="zh-CN" altLang="en-US" sz="1100" dirty="0">
@@ -14085,7 +13569,7 @@
                   <a:sysClr val="windowText" lastClr="000000"/>
                 </a:solidFill>
               </a:rPr>
-              <a:t>person2</a:t>
+              <a:t>dst</a:t>
             </a:r>
             <a:r>
               <a:rPr kumimoji="1" lang="en-US" altLang="zh-CN" sz="1100" dirty="0">
@@ -14172,7 +13656,7 @@
                   <a:sysClr val="windowText" lastClr="000000"/>
                 </a:solidFill>
               </a:rPr>
-              <a:t>person1:</a:t>
+              <a:t>src:</a:t>
             </a:r>
             <a:r>
               <a:rPr kumimoji="1" lang="zh-CN" altLang="en-US" sz="1100" b="1" dirty="0">
@@ -14248,7 +13732,7 @@
                 <a:latin typeface="等线" panose="02010600030101010101" pitchFamily="2" charset="-122"/>
                 <a:ea typeface="等线" panose="02010600030101010101" pitchFamily="2" charset="-122"/>
               </a:rPr>
-              <a:t>person.id</a:t>
+              <a:t>id</a:t>
             </a:r>
             <a:r>
               <a:rPr kumimoji="1" lang="zh-CN" altLang="en-US" sz="1100" dirty="0">
@@ -14516,7 +14000,7 @@
                   <a:sysClr val="windowText" lastClr="000000"/>
                 </a:solidFill>
               </a:rPr>
-              <a:t>person2:</a:t>
+              <a:t>dst:</a:t>
             </a:r>
             <a:r>
               <a:rPr kumimoji="1" lang="zh-CN" altLang="en-US" sz="1100" b="1" dirty="0">
@@ -14592,7 +14076,7 @@
                 <a:latin typeface="等线" panose="02010600030101010101" pitchFamily="2" charset="-122"/>
                 <a:ea typeface="等线" panose="02010600030101010101" pitchFamily="2" charset="-122"/>
               </a:rPr>
-              <a:t>person.id</a:t>
+              <a:t>id</a:t>
             </a:r>
             <a:r>
               <a:rPr kumimoji="1" lang="zh-CN" altLang="en-US" sz="1100" dirty="0">
@@ -15792,24 +15276,14 @@
           <a:p>
             <a:pPr algn="ctr"/>
             <a:r>
-              <a:rPr kumimoji="1" lang="en-US" altLang="zh-CN" sz="1200" b="1" dirty="0">
+              <a:rPr kumimoji="1" lang="en-US" altLang="zh-CN" sz="1200" dirty="0">
                 <a:solidFill>
                   <a:sysClr val="windowText" lastClr="000000"/>
                 </a:solidFill>
                 <a:latin typeface="等线" panose="02010600030101010101" pitchFamily="2" charset="-122"/>
                 <a:ea typeface="等线" panose="02010600030101010101" pitchFamily="2" charset="-122"/>
               </a:rPr>
-              <a:t>p1</a:t>
-            </a:r>
-            <a:r>
-              <a:rPr kumimoji="1" lang="en-US" altLang="zh-CN" sz="1200" dirty="0">
-                <a:solidFill>
-                  <a:sysClr val="windowText" lastClr="000000"/>
-                </a:solidFill>
-                <a:latin typeface="等线" panose="02010600030101010101" pitchFamily="2" charset="-122"/>
-                <a:ea typeface="等线" panose="02010600030101010101" pitchFamily="2" charset="-122"/>
-              </a:rPr>
-              <a:t>.id</a:t>
+              <a:t>id</a:t>
             </a:r>
             <a:r>
               <a:rPr kumimoji="1" lang="zh-CN" altLang="en-US" sz="1200" dirty="0">
@@ -16169,7 +15643,7 @@
                   <a:sysClr val="windowText" lastClr="000000"/>
                 </a:solidFill>
               </a:rPr>
-              <a:t>person1:</a:t>
+              <a:t>src:</a:t>
             </a:r>
             <a:r>
               <a:rPr kumimoji="1" lang="zh-CN" altLang="en-US" sz="1100" b="1" dirty="0">
@@ -16427,7 +15901,7 @@
                   <a:sysClr val="windowText" lastClr="000000"/>
                 </a:solidFill>
               </a:rPr>
-              <a:t>person2:</a:t>
+              <a:t>dst:</a:t>
             </a:r>
             <a:r>
               <a:rPr kumimoji="1" lang="zh-CN" altLang="en-US" sz="1100" b="1" dirty="0">

</xml_diff>